<commit_message>
flow and temp sync basin analysis done. between site synchrony global done
</commit_message>
<xml_diff>
--- a/Figures/figures.pptx
+++ b/Figures/figures.pptx
@@ -7,9 +7,11 @@
   <p:sldIdLst>
     <p:sldId id="256" r:id="rId2"/>
     <p:sldId id="257" r:id="rId3"/>
-    <p:sldId id="258" r:id="rId4"/>
-    <p:sldId id="259" r:id="rId5"/>
-    <p:sldId id="260" r:id="rId6"/>
+    <p:sldId id="261" r:id="rId4"/>
+    <p:sldId id="258" r:id="rId5"/>
+    <p:sldId id="262" r:id="rId6"/>
+    <p:sldId id="259" r:id="rId7"/>
+    <p:sldId id="260" r:id="rId8"/>
   </p:sldIdLst>
   <p:sldSz cx="12192000" cy="6858000"/>
   <p:notesSz cx="6858000" cy="9144000"/>
@@ -263,7 +265,7 @@
           <a:p>
             <a:fld id="{12C5E19A-9E5D-2F43-B6D1-A0D6AB8695AB}" type="datetimeFigureOut">
               <a:rPr lang="en-US" smtClean="0"/>
-              <a:t>2/11/21</a:t>
+              <a:t>2/25/21</a:t>
             </a:fld>
             <a:endParaRPr lang="en-US"/>
           </a:p>
@@ -461,7 +463,7 @@
           <a:p>
             <a:fld id="{12C5E19A-9E5D-2F43-B6D1-A0D6AB8695AB}" type="datetimeFigureOut">
               <a:rPr lang="en-US" smtClean="0"/>
-              <a:t>2/11/21</a:t>
+              <a:t>2/25/21</a:t>
             </a:fld>
             <a:endParaRPr lang="en-US"/>
           </a:p>
@@ -669,7 +671,7 @@
           <a:p>
             <a:fld id="{12C5E19A-9E5D-2F43-B6D1-A0D6AB8695AB}" type="datetimeFigureOut">
               <a:rPr lang="en-US" smtClean="0"/>
-              <a:t>2/11/21</a:t>
+              <a:t>2/25/21</a:t>
             </a:fld>
             <a:endParaRPr lang="en-US"/>
           </a:p>
@@ -867,7 +869,7 @@
           <a:p>
             <a:fld id="{12C5E19A-9E5D-2F43-B6D1-A0D6AB8695AB}" type="datetimeFigureOut">
               <a:rPr lang="en-US" smtClean="0"/>
-              <a:t>2/11/21</a:t>
+              <a:t>2/25/21</a:t>
             </a:fld>
             <a:endParaRPr lang="en-US"/>
           </a:p>
@@ -1142,7 +1144,7 @@
           <a:p>
             <a:fld id="{12C5E19A-9E5D-2F43-B6D1-A0D6AB8695AB}" type="datetimeFigureOut">
               <a:rPr lang="en-US" smtClean="0"/>
-              <a:t>2/11/21</a:t>
+              <a:t>2/25/21</a:t>
             </a:fld>
             <a:endParaRPr lang="en-US"/>
           </a:p>
@@ -1407,7 +1409,7 @@
           <a:p>
             <a:fld id="{12C5E19A-9E5D-2F43-B6D1-A0D6AB8695AB}" type="datetimeFigureOut">
               <a:rPr lang="en-US" smtClean="0"/>
-              <a:t>2/11/21</a:t>
+              <a:t>2/25/21</a:t>
             </a:fld>
             <a:endParaRPr lang="en-US"/>
           </a:p>
@@ -1819,7 +1821,7 @@
           <a:p>
             <a:fld id="{12C5E19A-9E5D-2F43-B6D1-A0D6AB8695AB}" type="datetimeFigureOut">
               <a:rPr lang="en-US" smtClean="0"/>
-              <a:t>2/11/21</a:t>
+              <a:t>2/25/21</a:t>
             </a:fld>
             <a:endParaRPr lang="en-US"/>
           </a:p>
@@ -1960,7 +1962,7 @@
           <a:p>
             <a:fld id="{12C5E19A-9E5D-2F43-B6D1-A0D6AB8695AB}" type="datetimeFigureOut">
               <a:rPr lang="en-US" smtClean="0"/>
-              <a:t>2/11/21</a:t>
+              <a:t>2/25/21</a:t>
             </a:fld>
             <a:endParaRPr lang="en-US"/>
           </a:p>
@@ -2073,7 +2075,7 @@
           <a:p>
             <a:fld id="{12C5E19A-9E5D-2F43-B6D1-A0D6AB8695AB}" type="datetimeFigureOut">
               <a:rPr lang="en-US" smtClean="0"/>
-              <a:t>2/11/21</a:t>
+              <a:t>2/25/21</a:t>
             </a:fld>
             <a:endParaRPr lang="en-US"/>
           </a:p>
@@ -2384,7 +2386,7 @@
           <a:p>
             <a:fld id="{12C5E19A-9E5D-2F43-B6D1-A0D6AB8695AB}" type="datetimeFigureOut">
               <a:rPr lang="en-US" smtClean="0"/>
-              <a:t>2/11/21</a:t>
+              <a:t>2/25/21</a:t>
             </a:fld>
             <a:endParaRPr lang="en-US"/>
           </a:p>
@@ -2672,7 +2674,7 @@
           <a:p>
             <a:fld id="{12C5E19A-9E5D-2F43-B6D1-A0D6AB8695AB}" type="datetimeFigureOut">
               <a:rPr lang="en-US" smtClean="0"/>
-              <a:t>2/11/21</a:t>
+              <a:t>2/25/21</a:t>
             </a:fld>
             <a:endParaRPr lang="en-US"/>
           </a:p>
@@ -2913,7 +2915,7 @@
           <a:p>
             <a:fld id="{12C5E19A-9E5D-2F43-B6D1-A0D6AB8695AB}" type="datetimeFigureOut">
               <a:rPr lang="en-US" smtClean="0"/>
-              <a:t>2/11/21</a:t>
+              <a:t>2/25/21</a:t>
             </a:fld>
             <a:endParaRPr lang="en-US"/>
           </a:p>
@@ -3579,6 +3581,315 @@
           <a:chExt cx="0" cy="0"/>
         </a:xfrm>
       </p:grpSpPr>
+      <p:grpSp>
+        <p:nvGrpSpPr>
+          <p:cNvPr id="18" name="Group 17">
+            <a:extLst>
+              <a:ext uri="{FF2B5EF4-FFF2-40B4-BE49-F238E27FC236}">
+                <a16:creationId xmlns:a16="http://schemas.microsoft.com/office/drawing/2014/main" id="{E58791C8-14B5-8F47-AE1F-1635CEFF0E5E}"/>
+              </a:ext>
+            </a:extLst>
+          </p:cNvPr>
+          <p:cNvGrpSpPr/>
+          <p:nvPr/>
+        </p:nvGrpSpPr>
+        <p:grpSpPr>
+          <a:xfrm>
+            <a:off x="1249106" y="261910"/>
+            <a:ext cx="8961695" cy="6560883"/>
+            <a:chOff x="1249106" y="261910"/>
+            <a:chExt cx="8961695" cy="6560883"/>
+          </a:xfrm>
+        </p:grpSpPr>
+        <p:pic>
+          <p:nvPicPr>
+            <p:cNvPr id="7" name="Picture 6">
+              <a:extLst>
+                <a:ext uri="{FF2B5EF4-FFF2-40B4-BE49-F238E27FC236}">
+                  <a16:creationId xmlns:a16="http://schemas.microsoft.com/office/drawing/2014/main" id="{4E1DC08C-D3DC-BC46-9A06-2571949AFD17}"/>
+                </a:ext>
+              </a:extLst>
+            </p:cNvPr>
+            <p:cNvPicPr>
+              <a:picLocks noChangeAspect="1"/>
+            </p:cNvPicPr>
+            <p:nvPr/>
+          </p:nvPicPr>
+          <p:blipFill>
+            <a:blip r:embed="rId2"/>
+            <a:srcRect/>
+            <a:stretch/>
+          </p:blipFill>
+          <p:spPr>
+            <a:xfrm>
+              <a:off x="5939929" y="261910"/>
+              <a:ext cx="3800507" cy="3167089"/>
+            </a:xfrm>
+            <a:prstGeom prst="rect">
+              <a:avLst/>
+            </a:prstGeom>
+          </p:spPr>
+        </p:pic>
+        <p:pic>
+          <p:nvPicPr>
+            <p:cNvPr id="3" name="Picture 2">
+              <a:extLst>
+                <a:ext uri="{FF2B5EF4-FFF2-40B4-BE49-F238E27FC236}">
+                  <a16:creationId xmlns:a16="http://schemas.microsoft.com/office/drawing/2014/main" id="{A3451DE8-F95E-BF48-ACB0-3068BCB78E1C}"/>
+                </a:ext>
+              </a:extLst>
+            </p:cNvPr>
+            <p:cNvPicPr>
+              <a:picLocks noChangeAspect="1"/>
+            </p:cNvPicPr>
+            <p:nvPr/>
+          </p:nvPicPr>
+          <p:blipFill>
+            <a:blip r:embed="rId3"/>
+            <a:srcRect/>
+            <a:stretch/>
+          </p:blipFill>
+          <p:spPr>
+            <a:xfrm>
+              <a:off x="1249107" y="261911"/>
+              <a:ext cx="3800507" cy="3167089"/>
+            </a:xfrm>
+            <a:prstGeom prst="rect">
+              <a:avLst/>
+            </a:prstGeom>
+          </p:spPr>
+        </p:pic>
+        <p:pic>
+          <p:nvPicPr>
+            <p:cNvPr id="4" name="Picture 3" descr="Chart, scatter chart&#10;&#10;Description automatically generated">
+              <a:extLst>
+                <a:ext uri="{FF2B5EF4-FFF2-40B4-BE49-F238E27FC236}">
+                  <a16:creationId xmlns:a16="http://schemas.microsoft.com/office/drawing/2014/main" id="{581A291D-2382-1F4F-87B7-5EBA78E6AF88}"/>
+                </a:ext>
+              </a:extLst>
+            </p:cNvPr>
+            <p:cNvPicPr>
+              <a:picLocks noChangeAspect="1"/>
+            </p:cNvPicPr>
+            <p:nvPr/>
+          </p:nvPicPr>
+          <p:blipFill>
+            <a:blip r:embed="rId4"/>
+            <a:stretch>
+              <a:fillRect/>
+            </a:stretch>
+          </p:blipFill>
+          <p:spPr>
+            <a:xfrm>
+              <a:off x="1249106" y="3524749"/>
+              <a:ext cx="3800507" cy="3167089"/>
+            </a:xfrm>
+            <a:prstGeom prst="rect">
+              <a:avLst/>
+            </a:prstGeom>
+          </p:spPr>
+        </p:pic>
+        <p:pic>
+          <p:nvPicPr>
+            <p:cNvPr id="13" name="Picture 12" descr="Chart, scatter chart&#10;&#10;Description automatically generated">
+              <a:extLst>
+                <a:ext uri="{FF2B5EF4-FFF2-40B4-BE49-F238E27FC236}">
+                  <a16:creationId xmlns:a16="http://schemas.microsoft.com/office/drawing/2014/main" id="{431C1C84-C973-9041-9EBB-94329670FEB7}"/>
+                </a:ext>
+              </a:extLst>
+            </p:cNvPr>
+            <p:cNvPicPr>
+              <a:picLocks noChangeAspect="1"/>
+            </p:cNvPicPr>
+            <p:nvPr/>
+          </p:nvPicPr>
+          <p:blipFill>
+            <a:blip r:embed="rId5"/>
+            <a:stretch>
+              <a:fillRect/>
+            </a:stretch>
+          </p:blipFill>
+          <p:spPr>
+            <a:xfrm>
+              <a:off x="6096000" y="3393792"/>
+              <a:ext cx="4114801" cy="3429001"/>
+            </a:xfrm>
+            <a:prstGeom prst="rect">
+              <a:avLst/>
+            </a:prstGeom>
+          </p:spPr>
+        </p:pic>
+      </p:grpSp>
+      <p:sp>
+        <p:nvSpPr>
+          <p:cNvPr id="14" name="TextBox 13">
+            <a:extLst>
+              <a:ext uri="{FF2B5EF4-FFF2-40B4-BE49-F238E27FC236}">
+                <a16:creationId xmlns:a16="http://schemas.microsoft.com/office/drawing/2014/main" id="{78973779-8372-5647-B0B3-2FF5654D7D50}"/>
+              </a:ext>
+            </a:extLst>
+          </p:cNvPr>
+          <p:cNvSpPr txBox="1"/>
+          <p:nvPr/>
+        </p:nvSpPr>
+        <p:spPr>
+          <a:xfrm>
+            <a:off x="909056" y="261910"/>
+            <a:ext cx="365806" cy="369332"/>
+          </a:xfrm>
+          <a:prstGeom prst="rect">
+            <a:avLst/>
+          </a:prstGeom>
+          <a:noFill/>
+        </p:spPr>
+        <p:txBody>
+          <a:bodyPr wrap="none" rtlCol="0">
+            <a:spAutoFit/>
+          </a:bodyPr>
+          <a:lstStyle/>
+          <a:p>
+            <a:r>
+              <a:rPr lang="en-US" dirty="0"/>
+              <a:t>a)</a:t>
+            </a:r>
+          </a:p>
+        </p:txBody>
+      </p:sp>
+      <p:sp>
+        <p:nvSpPr>
+          <p:cNvPr id="15" name="TextBox 14">
+            <a:extLst>
+              <a:ext uri="{FF2B5EF4-FFF2-40B4-BE49-F238E27FC236}">
+                <a16:creationId xmlns:a16="http://schemas.microsoft.com/office/drawing/2014/main" id="{28C0F064-1010-1F4D-81EB-5115C6619F4F}"/>
+              </a:ext>
+            </a:extLst>
+          </p:cNvPr>
+          <p:cNvSpPr txBox="1"/>
+          <p:nvPr/>
+        </p:nvSpPr>
+        <p:spPr>
+          <a:xfrm>
+            <a:off x="5718974" y="261910"/>
+            <a:ext cx="377026" cy="369332"/>
+          </a:xfrm>
+          <a:prstGeom prst="rect">
+            <a:avLst/>
+          </a:prstGeom>
+          <a:noFill/>
+        </p:spPr>
+        <p:txBody>
+          <a:bodyPr wrap="none" rtlCol="0">
+            <a:spAutoFit/>
+          </a:bodyPr>
+          <a:lstStyle/>
+          <a:p>
+            <a:r>
+              <a:rPr lang="en-US" dirty="0"/>
+              <a:t>b)</a:t>
+            </a:r>
+          </a:p>
+        </p:txBody>
+      </p:sp>
+      <p:sp>
+        <p:nvSpPr>
+          <p:cNvPr id="16" name="TextBox 15">
+            <a:extLst>
+              <a:ext uri="{FF2B5EF4-FFF2-40B4-BE49-F238E27FC236}">
+                <a16:creationId xmlns:a16="http://schemas.microsoft.com/office/drawing/2014/main" id="{E1113FC0-9073-B844-AA31-CC8FA5AE57DD}"/>
+              </a:ext>
+            </a:extLst>
+          </p:cNvPr>
+          <p:cNvSpPr txBox="1"/>
+          <p:nvPr/>
+        </p:nvSpPr>
+        <p:spPr>
+          <a:xfrm>
+            <a:off x="909056" y="3333251"/>
+            <a:ext cx="352982" cy="369332"/>
+          </a:xfrm>
+          <a:prstGeom prst="rect">
+            <a:avLst/>
+          </a:prstGeom>
+          <a:noFill/>
+        </p:spPr>
+        <p:txBody>
+          <a:bodyPr wrap="none" rtlCol="0">
+            <a:spAutoFit/>
+          </a:bodyPr>
+          <a:lstStyle/>
+          <a:p>
+            <a:r>
+              <a:rPr lang="en-US" dirty="0"/>
+              <a:t>c)</a:t>
+            </a:r>
+          </a:p>
+        </p:txBody>
+      </p:sp>
+      <p:sp>
+        <p:nvSpPr>
+          <p:cNvPr id="17" name="TextBox 16">
+            <a:extLst>
+              <a:ext uri="{FF2B5EF4-FFF2-40B4-BE49-F238E27FC236}">
+                <a16:creationId xmlns:a16="http://schemas.microsoft.com/office/drawing/2014/main" id="{4E73928E-1748-7648-ADA4-A7CE73FFB6FB}"/>
+              </a:ext>
+            </a:extLst>
+          </p:cNvPr>
+          <p:cNvSpPr txBox="1"/>
+          <p:nvPr/>
+        </p:nvSpPr>
+        <p:spPr>
+          <a:xfrm>
+            <a:off x="5857998" y="3340083"/>
+            <a:ext cx="377026" cy="369332"/>
+          </a:xfrm>
+          <a:prstGeom prst="rect">
+            <a:avLst/>
+          </a:prstGeom>
+          <a:noFill/>
+        </p:spPr>
+        <p:txBody>
+          <a:bodyPr wrap="none" rtlCol="0">
+            <a:spAutoFit/>
+          </a:bodyPr>
+          <a:lstStyle/>
+          <a:p>
+            <a:r>
+              <a:rPr lang="en-US" dirty="0"/>
+              <a:t>d)</a:t>
+            </a:r>
+          </a:p>
+        </p:txBody>
+      </p:sp>
+    </p:spTree>
+    <p:extLst>
+      <p:ext uri="{BB962C8B-B14F-4D97-AF65-F5344CB8AC3E}">
+        <p14:creationId xmlns:p14="http://schemas.microsoft.com/office/powerpoint/2010/main" val="955469835"/>
+      </p:ext>
+    </p:extLst>
+  </p:cSld>
+  <p:clrMapOvr>
+    <a:masterClrMapping/>
+  </p:clrMapOvr>
+</p:sld>
+</file>
+
+<file path=ppt/slides/slide4.xml><?xml version="1.0" encoding="utf-8"?>
+<p:sld xmlns:a="http://schemas.openxmlformats.org/drawingml/2006/main" xmlns:r="http://schemas.openxmlformats.org/officeDocument/2006/relationships" xmlns:p="http://schemas.openxmlformats.org/presentationml/2006/main">
+  <p:cSld>
+    <p:spTree>
+      <p:nvGrpSpPr>
+        <p:cNvPr id="1" name=""/>
+        <p:cNvGrpSpPr/>
+        <p:nvPr/>
+      </p:nvGrpSpPr>
+      <p:grpSpPr>
+        <a:xfrm>
+          <a:off x="0" y="0"/>
+          <a:ext cx="0" cy="0"/>
+          <a:chOff x="0" y="0"/>
+          <a:chExt cx="0" cy="0"/>
+        </a:xfrm>
+      </p:grpSpPr>
       <p:pic>
         <p:nvPicPr>
           <p:cNvPr id="7" name="Picture 6">
@@ -3650,7 +3961,66 @@
 </p:sld>
 </file>
 
-<file path=ppt/slides/slide4.xml><?xml version="1.0" encoding="utf-8"?>
+<file path=ppt/slides/slide5.xml><?xml version="1.0" encoding="utf-8"?>
+<p:sld xmlns:a="http://schemas.openxmlformats.org/drawingml/2006/main" xmlns:r="http://schemas.openxmlformats.org/officeDocument/2006/relationships" xmlns:p="http://schemas.openxmlformats.org/presentationml/2006/main">
+  <p:cSld>
+    <p:spTree>
+      <p:nvGrpSpPr>
+        <p:cNvPr id="1" name=""/>
+        <p:cNvGrpSpPr/>
+        <p:nvPr/>
+      </p:nvGrpSpPr>
+      <p:grpSpPr>
+        <a:xfrm>
+          <a:off x="0" y="0"/>
+          <a:ext cx="0" cy="0"/>
+          <a:chOff x="0" y="0"/>
+          <a:chExt cx="0" cy="0"/>
+        </a:xfrm>
+      </p:grpSpPr>
+      <p:pic>
+        <p:nvPicPr>
+          <p:cNvPr id="3" name="Picture 2">
+            <a:extLst>
+              <a:ext uri="{FF2B5EF4-FFF2-40B4-BE49-F238E27FC236}">
+                <a16:creationId xmlns:a16="http://schemas.microsoft.com/office/drawing/2014/main" id="{A3451DE8-F95E-BF48-ACB0-3068BCB78E1C}"/>
+              </a:ext>
+            </a:extLst>
+          </p:cNvPr>
+          <p:cNvPicPr>
+            <a:picLocks noChangeAspect="1"/>
+          </p:cNvPicPr>
+          <p:nvPr/>
+        </p:nvPicPr>
+        <p:blipFill>
+          <a:blip r:embed="rId2"/>
+          <a:srcRect/>
+          <a:stretch/>
+        </p:blipFill>
+        <p:spPr>
+          <a:xfrm>
+            <a:off x="1296384" y="1375000"/>
+            <a:ext cx="4607460" cy="3839550"/>
+          </a:xfrm>
+          <a:prstGeom prst="rect">
+            <a:avLst/>
+          </a:prstGeom>
+        </p:spPr>
+      </p:pic>
+    </p:spTree>
+    <p:extLst>
+      <p:ext uri="{BB962C8B-B14F-4D97-AF65-F5344CB8AC3E}">
+        <p14:creationId xmlns:p14="http://schemas.microsoft.com/office/powerpoint/2010/main" val="2616593153"/>
+      </p:ext>
+    </p:extLst>
+  </p:cSld>
+  <p:clrMapOvr>
+    <a:masterClrMapping/>
+  </p:clrMapOvr>
+</p:sld>
+</file>
+
+<file path=ppt/slides/slide6.xml><?xml version="1.0" encoding="utf-8"?>
 <p:sld xmlns:a="http://schemas.openxmlformats.org/drawingml/2006/main" xmlns:r="http://schemas.openxmlformats.org/officeDocument/2006/relationships" xmlns:p="http://schemas.openxmlformats.org/presentationml/2006/main">
   <p:cSld>
     <p:spTree>
@@ -3770,7 +4140,7 @@
 </p:sld>
 </file>
 
-<file path=ppt/slides/slide5.xml><?xml version="1.0" encoding="utf-8"?>
+<file path=ppt/slides/slide7.xml><?xml version="1.0" encoding="utf-8"?>
 <p:sld xmlns:a="http://schemas.openxmlformats.org/drawingml/2006/main" xmlns:r="http://schemas.openxmlformats.org/officeDocument/2006/relationships" xmlns:p="http://schemas.openxmlformats.org/presentationml/2006/main">
   <p:cSld>
     <p:spTree>

</xml_diff>

<commit_message>
between site synchrony, no boundaries run
</commit_message>
<xml_diff>
--- a/Figures/figures.pptx
+++ b/Figures/figures.pptx
@@ -9,9 +9,11 @@
     <p:sldId id="257" r:id="rId3"/>
     <p:sldId id="261" r:id="rId4"/>
     <p:sldId id="258" r:id="rId5"/>
-    <p:sldId id="262" r:id="rId6"/>
-    <p:sldId id="259" r:id="rId7"/>
-    <p:sldId id="260" r:id="rId8"/>
+    <p:sldId id="264" r:id="rId6"/>
+    <p:sldId id="262" r:id="rId7"/>
+    <p:sldId id="263" r:id="rId8"/>
+    <p:sldId id="259" r:id="rId9"/>
+    <p:sldId id="260" r:id="rId10"/>
   </p:sldIdLst>
   <p:sldSz cx="12192000" cy="6858000"/>
   <p:notesSz cx="6858000" cy="9144000"/>
@@ -265,7 +267,7 @@
           <a:p>
             <a:fld id="{12C5E19A-9E5D-2F43-B6D1-A0D6AB8695AB}" type="datetimeFigureOut">
               <a:rPr lang="en-US" smtClean="0"/>
-              <a:t>2/25/21</a:t>
+              <a:t>2/26/21</a:t>
             </a:fld>
             <a:endParaRPr lang="en-US"/>
           </a:p>
@@ -463,7 +465,7 @@
           <a:p>
             <a:fld id="{12C5E19A-9E5D-2F43-B6D1-A0D6AB8695AB}" type="datetimeFigureOut">
               <a:rPr lang="en-US" smtClean="0"/>
-              <a:t>2/25/21</a:t>
+              <a:t>2/26/21</a:t>
             </a:fld>
             <a:endParaRPr lang="en-US"/>
           </a:p>
@@ -671,7 +673,7 @@
           <a:p>
             <a:fld id="{12C5E19A-9E5D-2F43-B6D1-A0D6AB8695AB}" type="datetimeFigureOut">
               <a:rPr lang="en-US" smtClean="0"/>
-              <a:t>2/25/21</a:t>
+              <a:t>2/26/21</a:t>
             </a:fld>
             <a:endParaRPr lang="en-US"/>
           </a:p>
@@ -869,7 +871,7 @@
           <a:p>
             <a:fld id="{12C5E19A-9E5D-2F43-B6D1-A0D6AB8695AB}" type="datetimeFigureOut">
               <a:rPr lang="en-US" smtClean="0"/>
-              <a:t>2/25/21</a:t>
+              <a:t>2/26/21</a:t>
             </a:fld>
             <a:endParaRPr lang="en-US"/>
           </a:p>
@@ -1144,7 +1146,7 @@
           <a:p>
             <a:fld id="{12C5E19A-9E5D-2F43-B6D1-A0D6AB8695AB}" type="datetimeFigureOut">
               <a:rPr lang="en-US" smtClean="0"/>
-              <a:t>2/25/21</a:t>
+              <a:t>2/26/21</a:t>
             </a:fld>
             <a:endParaRPr lang="en-US"/>
           </a:p>
@@ -1409,7 +1411,7 @@
           <a:p>
             <a:fld id="{12C5E19A-9E5D-2F43-B6D1-A0D6AB8695AB}" type="datetimeFigureOut">
               <a:rPr lang="en-US" smtClean="0"/>
-              <a:t>2/25/21</a:t>
+              <a:t>2/26/21</a:t>
             </a:fld>
             <a:endParaRPr lang="en-US"/>
           </a:p>
@@ -1821,7 +1823,7 @@
           <a:p>
             <a:fld id="{12C5E19A-9E5D-2F43-B6D1-A0D6AB8695AB}" type="datetimeFigureOut">
               <a:rPr lang="en-US" smtClean="0"/>
-              <a:t>2/25/21</a:t>
+              <a:t>2/26/21</a:t>
             </a:fld>
             <a:endParaRPr lang="en-US"/>
           </a:p>
@@ -1962,7 +1964,7 @@
           <a:p>
             <a:fld id="{12C5E19A-9E5D-2F43-B6D1-A0D6AB8695AB}" type="datetimeFigureOut">
               <a:rPr lang="en-US" smtClean="0"/>
-              <a:t>2/25/21</a:t>
+              <a:t>2/26/21</a:t>
             </a:fld>
             <a:endParaRPr lang="en-US"/>
           </a:p>
@@ -2075,7 +2077,7 @@
           <a:p>
             <a:fld id="{12C5E19A-9E5D-2F43-B6D1-A0D6AB8695AB}" type="datetimeFigureOut">
               <a:rPr lang="en-US" smtClean="0"/>
-              <a:t>2/25/21</a:t>
+              <a:t>2/26/21</a:t>
             </a:fld>
             <a:endParaRPr lang="en-US"/>
           </a:p>
@@ -2386,7 +2388,7 @@
           <a:p>
             <a:fld id="{12C5E19A-9E5D-2F43-B6D1-A0D6AB8695AB}" type="datetimeFigureOut">
               <a:rPr lang="en-US" smtClean="0"/>
-              <a:t>2/25/21</a:t>
+              <a:t>2/26/21</a:t>
             </a:fld>
             <a:endParaRPr lang="en-US"/>
           </a:p>
@@ -2674,7 +2676,7 @@
           <a:p>
             <a:fld id="{12C5E19A-9E5D-2F43-B6D1-A0D6AB8695AB}" type="datetimeFigureOut">
               <a:rPr lang="en-US" smtClean="0"/>
-              <a:t>2/25/21</a:t>
+              <a:t>2/26/21</a:t>
             </a:fld>
             <a:endParaRPr lang="en-US"/>
           </a:p>
@@ -2915,7 +2917,7 @@
           <a:p>
             <a:fld id="{12C5E19A-9E5D-2F43-B6D1-A0D6AB8695AB}" type="datetimeFigureOut">
               <a:rPr lang="en-US" smtClean="0"/>
-              <a:t>2/25/21</a:t>
+              <a:t>2/26/21</a:t>
             </a:fld>
             <a:endParaRPr lang="en-US"/>
           </a:p>
@@ -3514,7 +3516,7 @@
         <p:spPr>
           <a:xfrm>
             <a:off x="6469121" y="1375000"/>
-            <a:ext cx="4607460" cy="3839551"/>
+            <a:ext cx="4607460" cy="3839550"/>
           </a:xfrm>
           <a:prstGeom prst="rect">
             <a:avLst/>
@@ -3523,7 +3525,7 @@
       </p:pic>
       <p:pic>
         <p:nvPicPr>
-          <p:cNvPr id="3" name="Picture 2" descr="Chart, scatter chart&#10;&#10;Description automatically generated">
+          <p:cNvPr id="3" name="Picture 2">
             <a:extLst>
               <a:ext uri="{FF2B5EF4-FFF2-40B4-BE49-F238E27FC236}">
                 <a16:creationId xmlns:a16="http://schemas.microsoft.com/office/drawing/2014/main" id="{A3451DE8-F95E-BF48-ACB0-3068BCB78E1C}"/>
@@ -3537,9 +3539,8 @@
         </p:nvPicPr>
         <p:blipFill>
           <a:blip r:embed="rId3"/>
-          <a:stretch>
-            <a:fillRect/>
-          </a:stretch>
+          <a:srcRect/>
+          <a:stretch/>
         </p:blipFill>
         <p:spPr>
           <a:xfrm>
@@ -3980,10 +3981,10 @@
       </p:grpSpPr>
       <p:pic>
         <p:nvPicPr>
-          <p:cNvPr id="3" name="Picture 2">
-            <a:extLst>
-              <a:ext uri="{FF2B5EF4-FFF2-40B4-BE49-F238E27FC236}">
-                <a16:creationId xmlns:a16="http://schemas.microsoft.com/office/drawing/2014/main" id="{A3451DE8-F95E-BF48-ACB0-3068BCB78E1C}"/>
+          <p:cNvPr id="7" name="Picture 6">
+            <a:extLst>
+              <a:ext uri="{FF2B5EF4-FFF2-40B4-BE49-F238E27FC236}">
+                <a16:creationId xmlns:a16="http://schemas.microsoft.com/office/drawing/2014/main" id="{4E1DC08C-D3DC-BC46-9A06-2571949AFD17}"/>
               </a:ext>
             </a:extLst>
           </p:cNvPr>
@@ -3999,6 +4000,35 @@
         </p:blipFill>
         <p:spPr>
           <a:xfrm>
+            <a:off x="6469121" y="1375000"/>
+            <a:ext cx="4607460" cy="3839550"/>
+          </a:xfrm>
+          <a:prstGeom prst="rect">
+            <a:avLst/>
+          </a:prstGeom>
+        </p:spPr>
+      </p:pic>
+      <p:pic>
+        <p:nvPicPr>
+          <p:cNvPr id="3" name="Picture 2">
+            <a:extLst>
+              <a:ext uri="{FF2B5EF4-FFF2-40B4-BE49-F238E27FC236}">
+                <a16:creationId xmlns:a16="http://schemas.microsoft.com/office/drawing/2014/main" id="{A3451DE8-F95E-BF48-ACB0-3068BCB78E1C}"/>
+              </a:ext>
+            </a:extLst>
+          </p:cNvPr>
+          <p:cNvPicPr>
+            <a:picLocks noChangeAspect="1"/>
+          </p:cNvPicPr>
+          <p:nvPr/>
+        </p:nvPicPr>
+        <p:blipFill>
+          <a:blip r:embed="rId3"/>
+          <a:srcRect/>
+          <a:stretch/>
+        </p:blipFill>
+        <p:spPr>
+          <a:xfrm>
             <a:off x="1296384" y="1375000"/>
             <a:ext cx="4607460" cy="3839550"/>
           </a:xfrm>
@@ -4010,7 +4040,7 @@
     </p:spTree>
     <p:extLst>
       <p:ext uri="{BB962C8B-B14F-4D97-AF65-F5344CB8AC3E}">
-        <p14:creationId xmlns:p14="http://schemas.microsoft.com/office/powerpoint/2010/main" val="2616593153"/>
+        <p14:creationId xmlns:p14="http://schemas.microsoft.com/office/powerpoint/2010/main" val="2591762053"/>
       </p:ext>
     </p:extLst>
   </p:cSld>
@@ -4039,6 +4069,155 @@
       </p:grpSpPr>
       <p:pic>
         <p:nvPicPr>
+          <p:cNvPr id="3" name="Picture 2">
+            <a:extLst>
+              <a:ext uri="{FF2B5EF4-FFF2-40B4-BE49-F238E27FC236}">
+                <a16:creationId xmlns:a16="http://schemas.microsoft.com/office/drawing/2014/main" id="{A3451DE8-F95E-BF48-ACB0-3068BCB78E1C}"/>
+              </a:ext>
+            </a:extLst>
+          </p:cNvPr>
+          <p:cNvPicPr>
+            <a:picLocks noChangeAspect="1"/>
+          </p:cNvPicPr>
+          <p:nvPr/>
+        </p:nvPicPr>
+        <p:blipFill>
+          <a:blip r:embed="rId2"/>
+          <a:srcRect/>
+          <a:stretch/>
+        </p:blipFill>
+        <p:spPr>
+          <a:xfrm>
+            <a:off x="1296384" y="1375000"/>
+            <a:ext cx="4607460" cy="3839550"/>
+          </a:xfrm>
+          <a:prstGeom prst="rect">
+            <a:avLst/>
+          </a:prstGeom>
+        </p:spPr>
+      </p:pic>
+    </p:spTree>
+    <p:extLst>
+      <p:ext uri="{BB962C8B-B14F-4D97-AF65-F5344CB8AC3E}">
+        <p14:creationId xmlns:p14="http://schemas.microsoft.com/office/powerpoint/2010/main" val="2616593153"/>
+      </p:ext>
+    </p:extLst>
+  </p:cSld>
+  <p:clrMapOvr>
+    <a:masterClrMapping/>
+  </p:clrMapOvr>
+</p:sld>
+</file>
+
+<file path=ppt/slides/slide7.xml><?xml version="1.0" encoding="utf-8"?>
+<p:sld xmlns:a="http://schemas.openxmlformats.org/drawingml/2006/main" xmlns:r="http://schemas.openxmlformats.org/officeDocument/2006/relationships" xmlns:p="http://schemas.openxmlformats.org/presentationml/2006/main">
+  <p:cSld>
+    <p:spTree>
+      <p:nvGrpSpPr>
+        <p:cNvPr id="1" name=""/>
+        <p:cNvGrpSpPr/>
+        <p:nvPr/>
+      </p:nvGrpSpPr>
+      <p:grpSpPr>
+        <a:xfrm>
+          <a:off x="0" y="0"/>
+          <a:ext cx="0" cy="0"/>
+          <a:chOff x="0" y="0"/>
+          <a:chExt cx="0" cy="0"/>
+        </a:xfrm>
+      </p:grpSpPr>
+      <p:pic>
+        <p:nvPicPr>
+          <p:cNvPr id="4" name="Picture 3" descr="Chart, scatter chart&#10;&#10;Description automatically generated">
+            <a:extLst>
+              <a:ext uri="{FF2B5EF4-FFF2-40B4-BE49-F238E27FC236}">
+                <a16:creationId xmlns:a16="http://schemas.microsoft.com/office/drawing/2014/main" id="{87FA8DA3-CCEB-8E4D-A4EB-769AD62283D6}"/>
+              </a:ext>
+            </a:extLst>
+          </p:cNvPr>
+          <p:cNvPicPr>
+            <a:picLocks noChangeAspect="1"/>
+          </p:cNvPicPr>
+          <p:nvPr/>
+        </p:nvPicPr>
+        <p:blipFill>
+          <a:blip r:embed="rId2"/>
+          <a:stretch>
+            <a:fillRect/>
+          </a:stretch>
+        </p:blipFill>
+        <p:spPr>
+          <a:xfrm>
+            <a:off x="1202725" y="1546311"/>
+            <a:ext cx="4518454" cy="3765378"/>
+          </a:xfrm>
+          <a:prstGeom prst="rect">
+            <a:avLst/>
+          </a:prstGeom>
+        </p:spPr>
+      </p:pic>
+      <p:pic>
+        <p:nvPicPr>
+          <p:cNvPr id="6" name="Picture 5" descr="Chart, scatter chart&#10;&#10;Description automatically generated">
+            <a:extLst>
+              <a:ext uri="{FF2B5EF4-FFF2-40B4-BE49-F238E27FC236}">
+                <a16:creationId xmlns:a16="http://schemas.microsoft.com/office/drawing/2014/main" id="{079359A0-8B62-3546-AFC6-EF8EF546B3D7}"/>
+              </a:ext>
+            </a:extLst>
+          </p:cNvPr>
+          <p:cNvPicPr>
+            <a:picLocks noChangeAspect="1"/>
+          </p:cNvPicPr>
+          <p:nvPr/>
+        </p:nvPicPr>
+        <p:blipFill>
+          <a:blip r:embed="rId3"/>
+          <a:stretch>
+            <a:fillRect/>
+          </a:stretch>
+        </p:blipFill>
+        <p:spPr>
+          <a:xfrm>
+            <a:off x="6219567" y="1546311"/>
+            <a:ext cx="4518454" cy="3765378"/>
+          </a:xfrm>
+          <a:prstGeom prst="rect">
+            <a:avLst/>
+          </a:prstGeom>
+        </p:spPr>
+      </p:pic>
+    </p:spTree>
+    <p:extLst>
+      <p:ext uri="{BB962C8B-B14F-4D97-AF65-F5344CB8AC3E}">
+        <p14:creationId xmlns:p14="http://schemas.microsoft.com/office/powerpoint/2010/main" val="2848520332"/>
+      </p:ext>
+    </p:extLst>
+  </p:cSld>
+  <p:clrMapOvr>
+    <a:masterClrMapping/>
+  </p:clrMapOvr>
+</p:sld>
+</file>
+
+<file path=ppt/slides/slide8.xml><?xml version="1.0" encoding="utf-8"?>
+<p:sld xmlns:a="http://schemas.openxmlformats.org/drawingml/2006/main" xmlns:r="http://schemas.openxmlformats.org/officeDocument/2006/relationships" xmlns:p="http://schemas.openxmlformats.org/presentationml/2006/main">
+  <p:cSld>
+    <p:spTree>
+      <p:nvGrpSpPr>
+        <p:cNvPr id="1" name=""/>
+        <p:cNvGrpSpPr/>
+        <p:nvPr/>
+      </p:nvGrpSpPr>
+      <p:grpSpPr>
+        <a:xfrm>
+          <a:off x="0" y="0"/>
+          <a:ext cx="0" cy="0"/>
+          <a:chOff x="0" y="0"/>
+          <a:chExt cx="0" cy="0"/>
+        </a:xfrm>
+      </p:grpSpPr>
+      <p:pic>
+        <p:nvPicPr>
           <p:cNvPr id="5" name="Picture 4" descr="Chart, histogram&#10;&#10;Description automatically generated">
             <a:extLst>
               <a:ext uri="{FF2B5EF4-FFF2-40B4-BE49-F238E27FC236}">
@@ -4140,7 +4319,7 @@
 </p:sld>
 </file>
 
-<file path=ppt/slides/slide7.xml><?xml version="1.0" encoding="utf-8"?>
+<file path=ppt/slides/slide9.xml><?xml version="1.0" encoding="utf-8"?>
 <p:sld xmlns:a="http://schemas.openxmlformats.org/drawingml/2006/main" xmlns:r="http://schemas.openxmlformats.org/officeDocument/2006/relationships" xmlns:p="http://schemas.openxmlformats.org/presentationml/2006/main">
   <p:cSld>
     <p:spTree>

</xml_diff>